<commit_message>
Banco de dados - Logins OK
</commit_message>
<xml_diff>
--- a/material/logo.pptx
+++ b/material/logo.pptx
@@ -3618,7 +3618,7 @@
         </p:nvSpPr>
         <p:spPr>
           <a:xfrm>
-            <a:off x="10707445" y="6164126"/>
+            <a:off x="10567594" y="6164126"/>
             <a:ext cx="1484555" cy="251233"/>
           </a:xfrm>
           <a:prstGeom prst="roundRect">
@@ -3672,15 +3672,16 @@
         </p:nvSpPr>
         <p:spPr>
           <a:xfrm>
-            <a:off x="279699" y="3625322"/>
+            <a:off x="139848" y="3625322"/>
             <a:ext cx="2399852" cy="1021976"/>
           </a:xfrm>
           <a:prstGeom prst="rect">
             <a:avLst/>
           </a:prstGeom>
           <a:solidFill>
-            <a:schemeClr val="bg1">
-              <a:lumMod val="65000"/>
+            <a:schemeClr val="tx1">
+              <a:lumMod val="85000"/>
+              <a:lumOff val="15000"/>
             </a:schemeClr>
           </a:solidFill>
         </p:spPr>
@@ -3726,7 +3727,7 @@
         </p:nvSpPr>
         <p:spPr>
           <a:xfrm>
-            <a:off x="3485477" y="2509216"/>
+            <a:off x="3345626" y="2509216"/>
             <a:ext cx="2399852" cy="1021976"/>
           </a:xfrm>
           <a:prstGeom prst="rect">
@@ -3780,7 +3781,7 @@
         </p:nvSpPr>
         <p:spPr>
           <a:xfrm>
-            <a:off x="3485477" y="4867830"/>
+            <a:off x="3345626" y="4867830"/>
             <a:ext cx="2399852" cy="1021976"/>
           </a:xfrm>
           <a:prstGeom prst="rect">
@@ -3834,7 +3835,7 @@
         </p:nvSpPr>
         <p:spPr>
           <a:xfrm>
-            <a:off x="6096000" y="2101998"/>
+            <a:off x="5956149" y="2101998"/>
             <a:ext cx="2399852" cy="411480"/>
           </a:xfrm>
           <a:prstGeom prst="rect">
@@ -3888,7 +3889,7 @@
         </p:nvSpPr>
         <p:spPr>
           <a:xfrm>
-            <a:off x="6096000" y="3496236"/>
+            <a:off x="5956149" y="3496236"/>
             <a:ext cx="2399852" cy="411480"/>
           </a:xfrm>
           <a:prstGeom prst="rect">
@@ -3942,7 +3943,7 @@
         </p:nvSpPr>
         <p:spPr>
           <a:xfrm>
-            <a:off x="8706523" y="3066877"/>
+            <a:off x="8566672" y="3066877"/>
             <a:ext cx="2399852" cy="411480"/>
           </a:xfrm>
           <a:prstGeom prst="rect">
@@ -3996,7 +3997,7 @@
         </p:nvSpPr>
         <p:spPr>
           <a:xfrm>
-            <a:off x="8706523" y="3498921"/>
+            <a:off x="8566672" y="3498921"/>
             <a:ext cx="2399852" cy="411480"/>
           </a:xfrm>
           <a:prstGeom prst="rect">
@@ -4050,7 +4051,7 @@
         </p:nvSpPr>
         <p:spPr>
           <a:xfrm>
-            <a:off x="8706523" y="3952481"/>
+            <a:off x="8566672" y="3952481"/>
             <a:ext cx="2399852" cy="411480"/>
           </a:xfrm>
           <a:prstGeom prst="rect">
@@ -4104,7 +4105,7 @@
         </p:nvSpPr>
         <p:spPr>
           <a:xfrm>
-            <a:off x="6096000" y="4298789"/>
+            <a:off x="5956149" y="4298789"/>
             <a:ext cx="2399852" cy="411480"/>
           </a:xfrm>
           <a:prstGeom prst="rect">
@@ -4158,7 +4159,7 @@
         </p:nvSpPr>
         <p:spPr>
           <a:xfrm>
-            <a:off x="6096000" y="4730833"/>
+            <a:off x="5956149" y="4730833"/>
             <a:ext cx="2399852" cy="411480"/>
           </a:xfrm>
           <a:prstGeom prst="rect">
@@ -4212,7 +4213,7 @@
         </p:nvSpPr>
         <p:spPr>
           <a:xfrm>
-            <a:off x="6096000" y="5162877"/>
+            <a:off x="5956149" y="5162877"/>
             <a:ext cx="2399852" cy="411480"/>
           </a:xfrm>
           <a:prstGeom prst="rect">
@@ -4266,7 +4267,7 @@
         </p:nvSpPr>
         <p:spPr>
           <a:xfrm>
-            <a:off x="6096000" y="5596657"/>
+            <a:off x="5956149" y="5596657"/>
             <a:ext cx="2399852" cy="411480"/>
           </a:xfrm>
           <a:prstGeom prst="rect">
@@ -4320,7 +4321,7 @@
         </p:nvSpPr>
         <p:spPr>
           <a:xfrm>
-            <a:off x="6096000" y="6028701"/>
+            <a:off x="5956149" y="6028701"/>
             <a:ext cx="2399852" cy="411480"/>
           </a:xfrm>
           <a:prstGeom prst="rect">
@@ -4374,7 +4375,7 @@
         </p:nvSpPr>
         <p:spPr>
           <a:xfrm>
-            <a:off x="8706523" y="4857636"/>
+            <a:off x="8566672" y="4857636"/>
             <a:ext cx="2399852" cy="1021976"/>
           </a:xfrm>
           <a:prstGeom prst="rect">
@@ -4428,7 +4429,7 @@
         </p:nvSpPr>
         <p:spPr>
           <a:xfrm>
-            <a:off x="737347" y="1949568"/>
+            <a:off x="597496" y="1949568"/>
             <a:ext cx="1484555" cy="251233"/>
           </a:xfrm>
           <a:prstGeom prst="roundRect">
@@ -4485,7 +4486,7 @@
         </p:nvCxnSpPr>
         <p:spPr>
           <a:xfrm>
-            <a:off x="1479625" y="2200801"/>
+            <a:off x="1339774" y="2200801"/>
             <a:ext cx="0" cy="1424521"/>
           </a:xfrm>
           <a:prstGeom prst="straightConnector1">
@@ -4527,7 +4528,7 @@
         </p:nvCxnSpPr>
         <p:spPr>
           <a:xfrm flipV="1">
-            <a:off x="2679551" y="3020204"/>
+            <a:off x="2539700" y="3020204"/>
             <a:ext cx="805926" cy="1116106"/>
           </a:xfrm>
           <a:prstGeom prst="bentConnector3">
@@ -4571,7 +4572,7 @@
         </p:nvCxnSpPr>
         <p:spPr>
           <a:xfrm>
-            <a:off x="2679551" y="4136310"/>
+            <a:off x="2539700" y="4136310"/>
             <a:ext cx="805926" cy="1242508"/>
           </a:xfrm>
           <a:prstGeom prst="bentConnector3">
@@ -4615,7 +4616,7 @@
         </p:nvCxnSpPr>
         <p:spPr>
           <a:xfrm flipV="1">
-            <a:off x="5885329" y="2307738"/>
+            <a:off x="5745478" y="2307738"/>
             <a:ext cx="210671" cy="712466"/>
           </a:xfrm>
           <a:prstGeom prst="bentConnector3">
@@ -4660,7 +4661,7 @@
         </p:nvCxnSpPr>
         <p:spPr>
           <a:xfrm>
-            <a:off x="5885329" y="3020204"/>
+            <a:off x="5745478" y="3020204"/>
             <a:ext cx="210671" cy="681772"/>
           </a:xfrm>
           <a:prstGeom prst="bentConnector3">
@@ -4704,7 +4705,7 @@
         </p:nvCxnSpPr>
         <p:spPr>
           <a:xfrm>
-            <a:off x="8495852" y="3701976"/>
+            <a:off x="8356001" y="3701976"/>
             <a:ext cx="210671" cy="2685"/>
           </a:xfrm>
           <a:prstGeom prst="straightConnector1">
@@ -4746,7 +4747,7 @@
         </p:nvCxnSpPr>
         <p:spPr>
           <a:xfrm flipV="1">
-            <a:off x="8495852" y="3272617"/>
+            <a:off x="8356001" y="3272617"/>
             <a:ext cx="210671" cy="429359"/>
           </a:xfrm>
           <a:prstGeom prst="bentConnector3">
@@ -4790,7 +4791,7 @@
         </p:nvCxnSpPr>
         <p:spPr>
           <a:xfrm>
-            <a:off x="8495852" y="3701976"/>
+            <a:off x="8356001" y="3701976"/>
             <a:ext cx="210671" cy="456245"/>
           </a:xfrm>
           <a:prstGeom prst="bentConnector3">
@@ -4834,7 +4835,7 @@
         </p:nvCxnSpPr>
         <p:spPr>
           <a:xfrm flipV="1">
-            <a:off x="5885329" y="4504529"/>
+            <a:off x="5745478" y="4504529"/>
             <a:ext cx="210671" cy="874289"/>
           </a:xfrm>
           <a:prstGeom prst="bentConnector3">
@@ -4879,7 +4880,7 @@
         </p:nvCxnSpPr>
         <p:spPr>
           <a:xfrm flipV="1">
-            <a:off x="5885329" y="4936573"/>
+            <a:off x="5745478" y="4936573"/>
             <a:ext cx="210671" cy="442245"/>
           </a:xfrm>
           <a:prstGeom prst="bentConnector3">
@@ -4924,7 +4925,7 @@
         </p:nvCxnSpPr>
         <p:spPr>
           <a:xfrm flipV="1">
-            <a:off x="5885329" y="5368617"/>
+            <a:off x="5745478" y="5368617"/>
             <a:ext cx="210671" cy="10201"/>
           </a:xfrm>
           <a:prstGeom prst="bentConnector3">
@@ -4969,7 +4970,7 @@
         </p:nvCxnSpPr>
         <p:spPr>
           <a:xfrm>
-            <a:off x="5885329" y="5378818"/>
+            <a:off x="5745478" y="5378818"/>
             <a:ext cx="210671" cy="423579"/>
           </a:xfrm>
           <a:prstGeom prst="bentConnector3">
@@ -5014,7 +5015,7 @@
         </p:nvCxnSpPr>
         <p:spPr>
           <a:xfrm>
-            <a:off x="5885329" y="5378818"/>
+            <a:off x="5745478" y="5378818"/>
             <a:ext cx="210671" cy="855623"/>
           </a:xfrm>
           <a:prstGeom prst="bentConnector3">
@@ -5059,7 +5060,7 @@
         </p:nvCxnSpPr>
         <p:spPr>
           <a:xfrm>
-            <a:off x="8495852" y="4504529"/>
+            <a:off x="8356001" y="4504529"/>
             <a:ext cx="210671" cy="864095"/>
           </a:xfrm>
           <a:prstGeom prst="bentConnector3">
@@ -5103,7 +5104,7 @@
         </p:nvCxnSpPr>
         <p:spPr>
           <a:xfrm>
-            <a:off x="8495852" y="4936573"/>
+            <a:off x="8356001" y="4936573"/>
             <a:ext cx="210671" cy="432051"/>
           </a:xfrm>
           <a:prstGeom prst="bentConnector3">
@@ -5147,7 +5148,7 @@
         </p:nvCxnSpPr>
         <p:spPr>
           <a:xfrm>
-            <a:off x="8495852" y="5368617"/>
+            <a:off x="8356001" y="5368617"/>
             <a:ext cx="210671" cy="7"/>
           </a:xfrm>
           <a:prstGeom prst="bentConnector3">
@@ -5191,7 +5192,7 @@
         </p:nvCxnSpPr>
         <p:spPr>
           <a:xfrm flipV="1">
-            <a:off x="8495852" y="5368624"/>
+            <a:off x="8356001" y="5368624"/>
             <a:ext cx="210671" cy="433773"/>
           </a:xfrm>
           <a:prstGeom prst="bentConnector3">
@@ -5235,7 +5236,7 @@
         </p:nvCxnSpPr>
         <p:spPr>
           <a:xfrm flipV="1">
-            <a:off x="8495852" y="5368624"/>
+            <a:off x="8356001" y="5368624"/>
             <a:ext cx="210671" cy="865817"/>
           </a:xfrm>
           <a:prstGeom prst="bentConnector3">
@@ -5279,7 +5280,7 @@
         </p:nvCxnSpPr>
         <p:spPr>
           <a:xfrm>
-            <a:off x="8495852" y="2307738"/>
+            <a:off x="8356001" y="2307738"/>
             <a:ext cx="2953871" cy="3856388"/>
           </a:xfrm>
           <a:prstGeom prst="bentConnector2">
@@ -5321,7 +5322,7 @@
         </p:nvCxnSpPr>
         <p:spPr>
           <a:xfrm>
-            <a:off x="11106375" y="5368624"/>
+            <a:off x="10966524" y="5368624"/>
             <a:ext cx="343348" cy="795502"/>
           </a:xfrm>
           <a:prstGeom prst="bentConnector2">

</xml_diff>